<commit_message>
tweaking simple object slides
</commit_message>
<xml_diff>
--- a/ClassMaterials/SimpleObjects/Slides/Part2-ObjectRefs.pptx
+++ b/ClassMaterials/SimpleObjects/Slides/Part2-ObjectRefs.pptx
@@ -2205,7 +2205,7 @@
               <a:pPr>
                 <a:defRPr/>
               </a:pPr>
-              <a:t>Tuesday, November 22, 2022</a:t>
+              <a:t>Sunday, December 4, 2022</a:t>
             </a:fld>
             <a:endParaRPr lang="en-US" dirty="0"/>
           </a:p>
@@ -2388,7 +2388,7 @@
               <a:pPr>
                 <a:defRPr/>
               </a:pPr>
-              <a:t>Tuesday, November 22, 2022</a:t>
+              <a:t>Sunday, December 4, 2022</a:t>
             </a:fld>
             <a:endParaRPr lang="en-US" dirty="0"/>
           </a:p>
@@ -8304,8 +8304,8 @@
         </p:nvSpPr>
         <p:spPr>
           <a:xfrm flipH="1">
-            <a:off x="5201500" y="3023100"/>
-            <a:ext cx="1398020" cy="154640"/>
+            <a:off x="3657600" y="3023100"/>
+            <a:ext cx="2941920" cy="124380"/>
           </a:xfrm>
           <a:custGeom>
             <a:avLst/>
@@ -8864,8 +8864,8 @@
         </p:nvSpPr>
         <p:spPr>
           <a:xfrm flipH="1">
-            <a:off x="4668840" y="2576880"/>
-            <a:ext cx="1930680" cy="277920"/>
+            <a:off x="3236040" y="2576880"/>
+            <a:ext cx="3363480" cy="295740"/>
           </a:xfrm>
           <a:custGeom>
             <a:avLst/>
@@ -11494,7 +11494,7 @@
         </p:nvSpPr>
         <p:spPr>
           <a:xfrm flipH="1">
-            <a:off x="4260670" y="1609289"/>
+            <a:off x="2994562" y="1609289"/>
             <a:ext cx="1303850" cy="664006"/>
           </a:xfrm>
           <a:custGeom>
@@ -11544,8 +11544,8 @@
         </p:nvSpPr>
         <p:spPr>
           <a:xfrm flipH="1">
-            <a:off x="4902200" y="2111950"/>
-            <a:ext cx="1089660" cy="364680"/>
+            <a:off x="3392940" y="2111949"/>
+            <a:ext cx="2598920" cy="400993"/>
           </a:xfrm>
           <a:custGeom>
             <a:avLst/>
@@ -14649,8 +14649,8 @@
         </p:nvSpPr>
         <p:spPr bwMode="auto">
           <a:xfrm>
-            <a:off x="8001000" y="6248400"/>
-            <a:ext cx="939800" cy="419100"/>
+            <a:off x="7480300" y="6248400"/>
+            <a:ext cx="1460500" cy="419100"/>
           </a:xfrm>
           <a:prstGeom prst="rect">
             <a:avLst/>
@@ -15169,17 +15169,6 @@
 </file>
 
 <file path=customXml/item2.xml><?xml version="1.0" encoding="utf-8"?>
-<p:properties xmlns:p="http://schemas.microsoft.com/office/2006/metadata/properties" xmlns:xsi="http://www.w3.org/2001/XMLSchema-instance" xmlns:pc="http://schemas.microsoft.com/office/infopath/2007/PartnerControls">
-  <documentManagement>
-    <TaxCatchAll xmlns="820f9cb1-409d-4c4b-8197-1d4f7dd48124" xsi:nil="true"/>
-    <lcf76f155ced4ddcb4097134ff3c332f xmlns="08600313-7276-4ca7-b5d3-7d86193ee0ac">
-      <Terms xmlns="http://schemas.microsoft.com/office/infopath/2007/PartnerControls"/>
-    </lcf76f155ced4ddcb4097134ff3c332f>
-  </documentManagement>
-</p:properties>
-</file>
-
-<file path=customXml/item3.xml><?xml version="1.0" encoding="utf-8"?>
 <ct:contentTypeSchema xmlns:ct="http://schemas.microsoft.com/office/2006/metadata/contentType" xmlns:ma="http://schemas.microsoft.com/office/2006/metadata/properties/metaAttributes" ct:_="" ma:_="" ma:contentTypeName="Document" ma:contentTypeID="0x0101004285D81DBE5F5A448E892B34D6B8CF20" ma:contentTypeVersion="8" ma:contentTypeDescription="Create a new document." ma:contentTypeScope="" ma:versionID="ecce54155d2ea7caa9aed06c8b6b9867">
   <xsd:schema xmlns:xsd="http://www.w3.org/2001/XMLSchema" xmlns:xs="http://www.w3.org/2001/XMLSchema" xmlns:p="http://schemas.microsoft.com/office/2006/metadata/properties" xmlns:ns2="08600313-7276-4ca7-b5d3-7d86193ee0ac" xmlns:ns3="820f9cb1-409d-4c4b-8197-1d4f7dd48124" targetNamespace="http://schemas.microsoft.com/office/2006/metadata/properties" ma:root="true" ma:fieldsID="bfd7385540b70b2fe84ac888cc214377" ns2:_="" ns3:_="">
     <xsd:import namespace="08600313-7276-4ca7-b5d3-7d86193ee0ac"/>
@@ -15356,6 +15345,17 @@
 </ct:contentTypeSchema>
 </file>
 
+<file path=customXml/item3.xml><?xml version="1.0" encoding="utf-8"?>
+<p:properties xmlns:p="http://schemas.microsoft.com/office/2006/metadata/properties" xmlns:xsi="http://www.w3.org/2001/XMLSchema-instance" xmlns:pc="http://schemas.microsoft.com/office/infopath/2007/PartnerControls">
+  <documentManagement>
+    <TaxCatchAll xmlns="820f9cb1-409d-4c4b-8197-1d4f7dd48124" xsi:nil="true"/>
+    <lcf76f155ced4ddcb4097134ff3c332f xmlns="08600313-7276-4ca7-b5d3-7d86193ee0ac">
+      <Terms xmlns="http://schemas.microsoft.com/office/infopath/2007/PartnerControls"/>
+    </lcf76f155ced4ddcb4097134ff3c332f>
+  </documentManagement>
+</p:properties>
+</file>
+
 <file path=customXml/itemProps1.xml><?xml version="1.0" encoding="utf-8"?>
 <ds:datastoreItem xmlns:ds="http://schemas.openxmlformats.org/officeDocument/2006/customXml" ds:itemID="{4CA9CB0E-EE65-449F-9559-F04F36359530}">
   <ds:schemaRefs>
@@ -15365,17 +15365,6 @@
 </file>
 
 <file path=customXml/itemProps2.xml><?xml version="1.0" encoding="utf-8"?>
-<ds:datastoreItem xmlns:ds="http://schemas.openxmlformats.org/officeDocument/2006/customXml" ds:itemID="{0BE3997C-5427-46BC-8C47-AFD73EF2B262}">
-  <ds:schemaRefs>
-    <ds:schemaRef ds:uri="http://schemas.microsoft.com/office/2006/metadata/properties"/>
-    <ds:schemaRef ds:uri="http://schemas.microsoft.com/office/infopath/2007/PartnerControls"/>
-    <ds:schemaRef ds:uri="820f9cb1-409d-4c4b-8197-1d4f7dd48124"/>
-    <ds:schemaRef ds:uri="08600313-7276-4ca7-b5d3-7d86193ee0ac"/>
-  </ds:schemaRefs>
-</ds:datastoreItem>
-</file>
-
-<file path=customXml/itemProps3.xml><?xml version="1.0" encoding="utf-8"?>
 <ds:datastoreItem xmlns:ds="http://schemas.openxmlformats.org/officeDocument/2006/customXml" ds:itemID="{4A4DCD66-1C57-4C3C-B2C3-DF827DC9D610}">
   <ds:schemaRefs>
     <ds:schemaRef ds:uri="http://schemas.microsoft.com/office/2006/metadata/contentType"/>
@@ -15392,4 +15381,15 @@
     <ds:schemaRef ds:uri="http://schemas.microsoft.com/internal/obd"/>
   </ds:schemaRefs>
 </ds:datastoreItem>
+</file>
+
+<file path=customXml/itemProps3.xml><?xml version="1.0" encoding="utf-8"?>
+<ds:datastoreItem xmlns:ds="http://schemas.openxmlformats.org/officeDocument/2006/customXml" ds:itemID="{0BE3997C-5427-46BC-8C47-AFD73EF2B262}">
+  <ds:schemaRefs>
+    <ds:schemaRef ds:uri="http://schemas.microsoft.com/office/2006/metadata/properties"/>
+    <ds:schemaRef ds:uri="http://schemas.microsoft.com/office/infopath/2007/PartnerControls"/>
+    <ds:schemaRef ds:uri="820f9cb1-409d-4c4b-8197-1d4f7dd48124"/>
+    <ds:schemaRef ds:uri="08600313-7276-4ca7-b5d3-7d86193ee0ac"/>
+  </ds:schemaRefs>
+</ds:datastoreItem>
 </file>
</xml_diff>